<commit_message>
further clean-up to powerpoint
</commit_message>
<xml_diff>
--- a/Scientist.net.pptx
+++ b/Scientist.net.pptx
@@ -6039,7 +6039,7 @@
         </p:nvSpPr>
         <p:spPr>
           <a:xfrm>
-            <a:off x="1151425" y="1047565"/>
+            <a:off x="1375982" y="1025371"/>
             <a:ext cx="9440034" cy="1806607"/>
           </a:xfrm>
         </p:spPr>
@@ -7283,15 +7283,33 @@
                                   </p:childTnLst>
                                 </p:cTn>
                               </p:par>
+                            </p:childTnLst>
+                          </p:cTn>
+                        </p:par>
+                      </p:childTnLst>
+                    </p:cTn>
+                  </p:par>
+                  <p:par>
+                    <p:cTn id="11" fill="hold">
+                      <p:stCondLst>
+                        <p:cond delay="indefinite"/>
+                      </p:stCondLst>
+                      <p:childTnLst>
+                        <p:par>
+                          <p:cTn id="12" fill="hold">
+                            <p:stCondLst>
+                              <p:cond delay="0"/>
+                            </p:stCondLst>
+                            <p:childTnLst>
                               <p:par>
-                                <p:cTn id="11" presetID="1" presetClass="entr" presetSubtype="0" fill="hold" grpId="0" nodeType="withEffect">
+                                <p:cTn id="13" presetID="1" presetClass="entr" presetSubtype="0" fill="hold" grpId="0" nodeType="clickEffect">
                                   <p:stCondLst>
                                     <p:cond delay="0"/>
                                   </p:stCondLst>
                                   <p:childTnLst>
                                     <p:set>
                                       <p:cBhvr>
-                                        <p:cTn id="12" dur="1" fill="hold">
+                                        <p:cTn id="14" dur="1" fill="hold">
                                           <p:stCondLst>
                                             <p:cond delay="0"/>
                                           </p:stCondLst>
@@ -7321,26 +7339,26 @@
                     </p:cTn>
                   </p:par>
                   <p:par>
-                    <p:cTn id="13" fill="hold">
+                    <p:cTn id="15" fill="hold">
                       <p:stCondLst>
                         <p:cond delay="indefinite"/>
                       </p:stCondLst>
                       <p:childTnLst>
                         <p:par>
-                          <p:cTn id="14" fill="hold">
+                          <p:cTn id="16" fill="hold">
                             <p:stCondLst>
                               <p:cond delay="0"/>
                             </p:stCondLst>
                             <p:childTnLst>
                               <p:par>
-                                <p:cTn id="15" presetID="1" presetClass="entr" presetSubtype="0" fill="hold" grpId="0" nodeType="clickEffect">
+                                <p:cTn id="17" presetID="1" presetClass="entr" presetSubtype="0" fill="hold" grpId="0" nodeType="clickEffect">
                                   <p:stCondLst>
                                     <p:cond delay="0"/>
                                   </p:stCondLst>
                                   <p:childTnLst>
                                     <p:set>
                                       <p:cBhvr>
-                                        <p:cTn id="16" dur="1" fill="hold">
+                                        <p:cTn id="18" dur="1" fill="hold">
                                           <p:stCondLst>
                                             <p:cond delay="0"/>
                                           </p:stCondLst>
@@ -7370,26 +7388,26 @@
                     </p:cTn>
                   </p:par>
                   <p:par>
-                    <p:cTn id="17" fill="hold">
+                    <p:cTn id="19" fill="hold">
                       <p:stCondLst>
                         <p:cond delay="indefinite"/>
                       </p:stCondLst>
                       <p:childTnLst>
                         <p:par>
-                          <p:cTn id="18" fill="hold">
+                          <p:cTn id="20" fill="hold">
                             <p:stCondLst>
                               <p:cond delay="0"/>
                             </p:stCondLst>
                             <p:childTnLst>
                               <p:par>
-                                <p:cTn id="19" presetID="1" presetClass="entr" presetSubtype="0" fill="hold" grpId="0" nodeType="clickEffect">
+                                <p:cTn id="21" presetID="1" presetClass="entr" presetSubtype="0" fill="hold" grpId="0" nodeType="clickEffect">
                                   <p:stCondLst>
                                     <p:cond delay="0"/>
                                   </p:stCondLst>
                                   <p:childTnLst>
                                     <p:set>
                                       <p:cBhvr>
-                                        <p:cTn id="20" dur="1" fill="hold">
+                                        <p:cTn id="22" dur="1" fill="hold">
                                           <p:stCondLst>
                                             <p:cond delay="0"/>
                                           </p:stCondLst>
@@ -7419,26 +7437,26 @@
                     </p:cTn>
                   </p:par>
                   <p:par>
-                    <p:cTn id="21" fill="hold">
+                    <p:cTn id="23" fill="hold">
                       <p:stCondLst>
                         <p:cond delay="indefinite"/>
                       </p:stCondLst>
                       <p:childTnLst>
                         <p:par>
-                          <p:cTn id="22" fill="hold">
+                          <p:cTn id="24" fill="hold">
                             <p:stCondLst>
                               <p:cond delay="0"/>
                             </p:stCondLst>
                             <p:childTnLst>
                               <p:par>
-                                <p:cTn id="23" presetID="1" presetClass="entr" presetSubtype="0" fill="hold" grpId="0" nodeType="clickEffect">
+                                <p:cTn id="25" presetID="1" presetClass="entr" presetSubtype="0" fill="hold" grpId="0" nodeType="clickEffect">
                                   <p:stCondLst>
                                     <p:cond delay="0"/>
                                   </p:stCondLst>
                                   <p:childTnLst>
                                     <p:set>
                                       <p:cBhvr>
-                                        <p:cTn id="24" dur="1" fill="hold">
+                                        <p:cTn id="26" dur="1" fill="hold">
                                           <p:stCondLst>
                                             <p:cond delay="0"/>
                                           </p:stCondLst>
@@ -7464,26 +7482,26 @@
                     </p:cTn>
                   </p:par>
                   <p:par>
-                    <p:cTn id="25" fill="hold">
+                    <p:cTn id="27" fill="hold">
                       <p:stCondLst>
                         <p:cond delay="indefinite"/>
                       </p:stCondLst>
                       <p:childTnLst>
                         <p:par>
-                          <p:cTn id="26" fill="hold">
+                          <p:cTn id="28" fill="hold">
                             <p:stCondLst>
                               <p:cond delay="0"/>
                             </p:stCondLst>
                             <p:childTnLst>
                               <p:par>
-                                <p:cTn id="27" presetID="1" presetClass="entr" presetSubtype="0" fill="hold" grpId="0" nodeType="clickEffect">
+                                <p:cTn id="29" presetID="1" presetClass="entr" presetSubtype="0" fill="hold" grpId="0" nodeType="clickEffect">
                                   <p:stCondLst>
                                     <p:cond delay="0"/>
                                   </p:stCondLst>
                                   <p:childTnLst>
                                     <p:set>
                                       <p:cBhvr>
-                                        <p:cTn id="28" dur="1" fill="hold">
+                                        <p:cTn id="30" dur="1" fill="hold">
                                           <p:stCondLst>
                                             <p:cond delay="0"/>
                                           </p:stCondLst>
@@ -7530,7 +7548,7 @@
       </p:par>
     </p:tnLst>
     <p:bldLst>
-      <p:bldP spid="8" grpId="0" build="p"/>
+      <p:bldP spid="8" grpId="0" uiExpand="1" build="p"/>
       <p:bldP spid="9" grpId="0"/>
       <p:bldP spid="10" grpId="0"/>
     </p:bldLst>
@@ -7573,8 +7591,8 @@
         </p:nvSpPr>
         <p:spPr>
           <a:xfrm>
-            <a:off x="1151425" y="1047565"/>
-            <a:ext cx="9440034" cy="1806607"/>
+            <a:off x="1375983" y="1331651"/>
+            <a:ext cx="9440034" cy="1531399"/>
           </a:xfrm>
         </p:spPr>
         <p:txBody>
@@ -7608,7 +7626,7 @@
         </p:nvSpPr>
         <p:spPr>
           <a:xfrm>
-            <a:off x="4817615" y="4083729"/>
+            <a:off x="4817615" y="4070413"/>
             <a:ext cx="2556769" cy="1748900"/>
           </a:xfrm>
         </p:spPr>
@@ -7678,8 +7696,8 @@
         </p:nvSpPr>
         <p:spPr>
           <a:xfrm>
-            <a:off x="2345219" y="2967335"/>
-            <a:ext cx="7908383" cy="461665"/>
+            <a:off x="2598975" y="2967335"/>
+            <a:ext cx="6544933" cy="461665"/>
           </a:xfrm>
           <a:prstGeom prst="rect">
             <a:avLst/>
@@ -7693,16 +7711,10 @@
           <a:lstStyle/>
           <a:p>
             <a:r>
-              <a:rPr lang="en-US" sz="2400" dirty="0"/>
-              <a:t>A </a:t>
-            </a:r>
-            <a:r>
-              <a:rPr lang="en-US" sz="2400" strike="sngStrike" dirty="0"/>
-              <a:t>Ruby</a:t>
-            </a:r>
-            <a:r>
-              <a:rPr lang="en-US" sz="2400" dirty="0"/>
-              <a:t> .NET library for carefully refactoring critical paths</a:t>
+              <a:rPr lang="en-GB" sz="2400" dirty="0">
+                <a:hlinkClick r:id="rId4"/>
+              </a:rPr>
+              <a:t>https://github.com/scientistproject/Scientist.net</a:t>
             </a:r>
             <a:endParaRPr lang="en-GB" sz="2400" dirty="0"/>
           </a:p>

</xml_diff>